<commit_message>
[added] directive and services in test-project
</commit_message>
<xml_diff>
--- a/Resources/Notes.pptx
+++ b/Resources/Notes.pptx
@@ -18,6 +18,8 @@
     <p:sldId id="266" r:id="rId12"/>
     <p:sldId id="267" r:id="rId13"/>
     <p:sldId id="268" r:id="rId14"/>
+    <p:sldId id="269" r:id="rId15"/>
+    <p:sldId id="270" r:id="rId16"/>
   </p:sldIdLst>
   <p:sldSz cx="12192000" cy="6858000"/>
   <p:notesSz cx="6858000" cy="9144000"/>
@@ -271,7 +273,7 @@
           <a:p>
             <a:fld id="{162DCEF9-7F5B-4235-8EC3-75D5AB177DA5}" type="datetimeFigureOut">
               <a:rPr lang="en-US" smtClean="0"/>
-              <a:t>5/10/2021</a:t>
+              <a:t>5/13/2021</a:t>
             </a:fld>
             <a:endParaRPr lang="en-US"/>
           </a:p>
@@ -469,7 +471,7 @@
           <a:p>
             <a:fld id="{162DCEF9-7F5B-4235-8EC3-75D5AB177DA5}" type="datetimeFigureOut">
               <a:rPr lang="en-US" smtClean="0"/>
-              <a:t>5/10/2021</a:t>
+              <a:t>5/13/2021</a:t>
             </a:fld>
             <a:endParaRPr lang="en-US"/>
           </a:p>
@@ -677,7 +679,7 @@
           <a:p>
             <a:fld id="{162DCEF9-7F5B-4235-8EC3-75D5AB177DA5}" type="datetimeFigureOut">
               <a:rPr lang="en-US" smtClean="0"/>
-              <a:t>5/10/2021</a:t>
+              <a:t>5/13/2021</a:t>
             </a:fld>
             <a:endParaRPr lang="en-US"/>
           </a:p>
@@ -875,7 +877,7 @@
           <a:p>
             <a:fld id="{162DCEF9-7F5B-4235-8EC3-75D5AB177DA5}" type="datetimeFigureOut">
               <a:rPr lang="en-US" smtClean="0"/>
-              <a:t>5/10/2021</a:t>
+              <a:t>5/13/2021</a:t>
             </a:fld>
             <a:endParaRPr lang="en-US"/>
           </a:p>
@@ -1150,7 +1152,7 @@
           <a:p>
             <a:fld id="{162DCEF9-7F5B-4235-8EC3-75D5AB177DA5}" type="datetimeFigureOut">
               <a:rPr lang="en-US" smtClean="0"/>
-              <a:t>5/10/2021</a:t>
+              <a:t>5/13/2021</a:t>
             </a:fld>
             <a:endParaRPr lang="en-US"/>
           </a:p>
@@ -1415,7 +1417,7 @@
           <a:p>
             <a:fld id="{162DCEF9-7F5B-4235-8EC3-75D5AB177DA5}" type="datetimeFigureOut">
               <a:rPr lang="en-US" smtClean="0"/>
-              <a:t>5/10/2021</a:t>
+              <a:t>5/13/2021</a:t>
             </a:fld>
             <a:endParaRPr lang="en-US"/>
           </a:p>
@@ -1827,7 +1829,7 @@
           <a:p>
             <a:fld id="{162DCEF9-7F5B-4235-8EC3-75D5AB177DA5}" type="datetimeFigureOut">
               <a:rPr lang="en-US" smtClean="0"/>
-              <a:t>5/10/2021</a:t>
+              <a:t>5/13/2021</a:t>
             </a:fld>
             <a:endParaRPr lang="en-US"/>
           </a:p>
@@ -1968,7 +1970,7 @@
           <a:p>
             <a:fld id="{162DCEF9-7F5B-4235-8EC3-75D5AB177DA5}" type="datetimeFigureOut">
               <a:rPr lang="en-US" smtClean="0"/>
-              <a:t>5/10/2021</a:t>
+              <a:t>5/13/2021</a:t>
             </a:fld>
             <a:endParaRPr lang="en-US"/>
           </a:p>
@@ -2081,7 +2083,7 @@
           <a:p>
             <a:fld id="{162DCEF9-7F5B-4235-8EC3-75D5AB177DA5}" type="datetimeFigureOut">
               <a:rPr lang="en-US" smtClean="0"/>
-              <a:t>5/10/2021</a:t>
+              <a:t>5/13/2021</a:t>
             </a:fld>
             <a:endParaRPr lang="en-US"/>
           </a:p>
@@ -2392,7 +2394,7 @@
           <a:p>
             <a:fld id="{162DCEF9-7F5B-4235-8EC3-75D5AB177DA5}" type="datetimeFigureOut">
               <a:rPr lang="en-US" smtClean="0"/>
-              <a:t>5/10/2021</a:t>
+              <a:t>5/13/2021</a:t>
             </a:fld>
             <a:endParaRPr lang="en-US"/>
           </a:p>
@@ -2680,7 +2682,7 @@
           <a:p>
             <a:fld id="{162DCEF9-7F5B-4235-8EC3-75D5AB177DA5}" type="datetimeFigureOut">
               <a:rPr lang="en-US" smtClean="0"/>
-              <a:t>5/10/2021</a:t>
+              <a:t>5/13/2021</a:t>
             </a:fld>
             <a:endParaRPr lang="en-US"/>
           </a:p>
@@ -2921,7 +2923,7 @@
           <a:p>
             <a:fld id="{162DCEF9-7F5B-4235-8EC3-75D5AB177DA5}" type="datetimeFigureOut">
               <a:rPr lang="en-US" smtClean="0"/>
-              <a:t>5/10/2021</a:t>
+              <a:t>5/13/2021</a:t>
             </a:fld>
             <a:endParaRPr lang="en-US"/>
           </a:p>
@@ -5063,6 +5065,1281 @@
 </p:sld>
 </file>
 
+<file path=ppt/slides/slide14.xml><?xml version="1.0" encoding="utf-8"?>
+<p:sld xmlns:a="http://schemas.openxmlformats.org/drawingml/2006/main" xmlns:r="http://schemas.openxmlformats.org/officeDocument/2006/relationships" xmlns:p="http://schemas.openxmlformats.org/presentationml/2006/main">
+  <p:cSld>
+    <p:spTree>
+      <p:nvGrpSpPr>
+        <p:cNvPr id="1" name=""/>
+        <p:cNvGrpSpPr/>
+        <p:nvPr/>
+      </p:nvGrpSpPr>
+      <p:grpSpPr>
+        <a:xfrm>
+          <a:off x="0" y="0"/>
+          <a:ext cx="0" cy="0"/>
+          <a:chOff x="0" y="0"/>
+          <a:chExt cx="0" cy="0"/>
+        </a:xfrm>
+      </p:grpSpPr>
+      <p:sp>
+        <p:nvSpPr>
+          <p:cNvPr id="2" name="Rectangle 1">
+            <a:extLst>
+              <a:ext uri="{FF2B5EF4-FFF2-40B4-BE49-F238E27FC236}">
+                <a16:creationId xmlns:a16="http://schemas.microsoft.com/office/drawing/2014/main" id="{F91FF200-C023-4143-B65E-B8CD4A4D0305}"/>
+              </a:ext>
+            </a:extLst>
+          </p:cNvPr>
+          <p:cNvSpPr/>
+          <p:nvPr/>
+        </p:nvSpPr>
+        <p:spPr>
+          <a:xfrm>
+            <a:off x="1301931" y="1409116"/>
+            <a:ext cx="2865120" cy="870857"/>
+          </a:xfrm>
+          <a:prstGeom prst="rect">
+            <a:avLst/>
+          </a:prstGeom>
+          <a:solidFill>
+            <a:schemeClr val="accent1">
+              <a:lumMod val="75000"/>
+            </a:schemeClr>
+          </a:solidFill>
+        </p:spPr>
+        <p:style>
+          <a:lnRef idx="2">
+            <a:schemeClr val="accent4">
+              <a:shade val="50000"/>
+            </a:schemeClr>
+          </a:lnRef>
+          <a:fillRef idx="1">
+            <a:schemeClr val="accent4"/>
+          </a:fillRef>
+          <a:effectRef idx="0">
+            <a:schemeClr val="accent4"/>
+          </a:effectRef>
+          <a:fontRef idx="minor">
+            <a:schemeClr val="lt1"/>
+          </a:fontRef>
+        </p:style>
+        <p:txBody>
+          <a:bodyPr rtlCol="0" anchor="ctr"/>
+          <a:lstStyle/>
+          <a:p>
+            <a:pPr algn="ctr"/>
+            <a:r>
+              <a:rPr lang="en-US" dirty="0" err="1"/>
+              <a:t>AppModule</a:t>
+            </a:r>
+            <a:endParaRPr lang="en-US" dirty="0"/>
+          </a:p>
+        </p:txBody>
+      </p:sp>
+      <p:sp>
+        <p:nvSpPr>
+          <p:cNvPr id="3" name="TextBox 2">
+            <a:extLst>
+              <a:ext uri="{FF2B5EF4-FFF2-40B4-BE49-F238E27FC236}">
+                <a16:creationId xmlns:a16="http://schemas.microsoft.com/office/drawing/2014/main" id="{51B1867C-F341-47DF-8935-6AA701DD5866}"/>
+              </a:ext>
+            </a:extLst>
+          </p:cNvPr>
+          <p:cNvSpPr txBox="1"/>
+          <p:nvPr/>
+        </p:nvSpPr>
+        <p:spPr>
+          <a:xfrm>
+            <a:off x="4167051" y="395443"/>
+            <a:ext cx="3614057" cy="584775"/>
+          </a:xfrm>
+          <a:prstGeom prst="rect">
+            <a:avLst/>
+          </a:prstGeom>
+          <a:noFill/>
+        </p:spPr>
+        <p:txBody>
+          <a:bodyPr wrap="square" rtlCol="0">
+            <a:spAutoFit/>
+          </a:bodyPr>
+          <a:lstStyle/>
+          <a:p>
+            <a:pPr algn="ctr"/>
+            <a:r>
+              <a:rPr lang="en-US" sz="3200" b="1" dirty="0"/>
+              <a:t>Hierarchical Injector</a:t>
+            </a:r>
+          </a:p>
+        </p:txBody>
+      </p:sp>
+      <p:sp>
+        <p:nvSpPr>
+          <p:cNvPr id="4" name="TextBox 3">
+            <a:extLst>
+              <a:ext uri="{FF2B5EF4-FFF2-40B4-BE49-F238E27FC236}">
+                <a16:creationId xmlns:a16="http://schemas.microsoft.com/office/drawing/2014/main" id="{BE943608-48C8-4465-85FB-F6D11DC97F57}"/>
+              </a:ext>
+            </a:extLst>
+          </p:cNvPr>
+          <p:cNvSpPr txBox="1"/>
+          <p:nvPr/>
+        </p:nvSpPr>
+        <p:spPr>
+          <a:xfrm>
+            <a:off x="5212076" y="1376994"/>
+            <a:ext cx="5551715" cy="888705"/>
+          </a:xfrm>
+          <a:prstGeom prst="rect">
+            <a:avLst/>
+          </a:prstGeom>
+        </p:spPr>
+        <p:style>
+          <a:lnRef idx="2">
+            <a:schemeClr val="accent5"/>
+          </a:lnRef>
+          <a:fillRef idx="1">
+            <a:schemeClr val="lt1"/>
+          </a:fillRef>
+          <a:effectRef idx="0">
+            <a:schemeClr val="accent5"/>
+          </a:effectRef>
+          <a:fontRef idx="minor">
+            <a:schemeClr val="dk1"/>
+          </a:fontRef>
+        </p:style>
+        <p:txBody>
+          <a:bodyPr wrap="square" rtlCol="0">
+            <a:spAutoFit/>
+          </a:bodyPr>
+          <a:lstStyle/>
+          <a:p>
+            <a:pPr>
+              <a:lnSpc>
+                <a:spcPct val="150000"/>
+              </a:lnSpc>
+            </a:pPr>
+            <a:r>
+              <a:rPr lang="my-MM" dirty="0"/>
+              <a:t>တူညီတဲ့ </a:t>
+            </a:r>
+            <a:r>
+              <a:rPr lang="en-US" dirty="0"/>
+              <a:t>service instance </a:t>
+            </a:r>
+            <a:r>
+              <a:rPr lang="my-MM" dirty="0"/>
+              <a:t>ကို </a:t>
+            </a:r>
+            <a:r>
+              <a:rPr lang="en-US" dirty="0"/>
+              <a:t>application wide</a:t>
+            </a:r>
+            <a:r>
+              <a:rPr lang="my-MM" dirty="0"/>
+              <a:t> အနေနဲ့ ရရှိပါမယ်။</a:t>
+            </a:r>
+            <a:endParaRPr lang="en-US" dirty="0"/>
+          </a:p>
+        </p:txBody>
+      </p:sp>
+      <p:sp>
+        <p:nvSpPr>
+          <p:cNvPr id="5" name="Rectangle 4">
+            <a:extLst>
+              <a:ext uri="{FF2B5EF4-FFF2-40B4-BE49-F238E27FC236}">
+                <a16:creationId xmlns:a16="http://schemas.microsoft.com/office/drawing/2014/main" id="{0045C322-6539-4445-A848-BB74D39906F9}"/>
+              </a:ext>
+            </a:extLst>
+          </p:cNvPr>
+          <p:cNvSpPr/>
+          <p:nvPr/>
+        </p:nvSpPr>
+        <p:spPr>
+          <a:xfrm>
+            <a:off x="1301931" y="3150830"/>
+            <a:ext cx="2865120" cy="870857"/>
+          </a:xfrm>
+          <a:prstGeom prst="rect">
+            <a:avLst/>
+          </a:prstGeom>
+          <a:solidFill>
+            <a:schemeClr val="accent1">
+              <a:lumMod val="75000"/>
+            </a:schemeClr>
+          </a:solidFill>
+        </p:spPr>
+        <p:style>
+          <a:lnRef idx="2">
+            <a:schemeClr val="accent4">
+              <a:shade val="50000"/>
+            </a:schemeClr>
+          </a:lnRef>
+          <a:fillRef idx="1">
+            <a:schemeClr val="accent4"/>
+          </a:fillRef>
+          <a:effectRef idx="0">
+            <a:schemeClr val="accent4"/>
+          </a:effectRef>
+          <a:fontRef idx="minor">
+            <a:schemeClr val="lt1"/>
+          </a:fontRef>
+        </p:style>
+        <p:txBody>
+          <a:bodyPr rtlCol="0" anchor="ctr"/>
+          <a:lstStyle/>
+          <a:p>
+            <a:pPr algn="ctr"/>
+            <a:r>
+              <a:rPr lang="en-US" dirty="0" err="1"/>
+              <a:t>AppComponent</a:t>
+            </a:r>
+            <a:endParaRPr lang="en-US" dirty="0"/>
+          </a:p>
+        </p:txBody>
+      </p:sp>
+      <p:sp>
+        <p:nvSpPr>
+          <p:cNvPr id="6" name="TextBox 5">
+            <a:extLst>
+              <a:ext uri="{FF2B5EF4-FFF2-40B4-BE49-F238E27FC236}">
+                <a16:creationId xmlns:a16="http://schemas.microsoft.com/office/drawing/2014/main" id="{4F038AFA-FEE6-4457-AD8C-A708412B5A1A}"/>
+              </a:ext>
+            </a:extLst>
+          </p:cNvPr>
+          <p:cNvSpPr txBox="1"/>
+          <p:nvPr/>
+        </p:nvSpPr>
+        <p:spPr>
+          <a:xfrm>
+            <a:off x="5212076" y="3139124"/>
+            <a:ext cx="5551715" cy="888705"/>
+          </a:xfrm>
+          <a:prstGeom prst="rect">
+            <a:avLst/>
+          </a:prstGeom>
+        </p:spPr>
+        <p:style>
+          <a:lnRef idx="2">
+            <a:schemeClr val="accent5"/>
+          </a:lnRef>
+          <a:fillRef idx="1">
+            <a:schemeClr val="lt1"/>
+          </a:fillRef>
+          <a:effectRef idx="0">
+            <a:schemeClr val="accent5"/>
+          </a:effectRef>
+          <a:fontRef idx="minor">
+            <a:schemeClr val="dk1"/>
+          </a:fontRef>
+        </p:style>
+        <p:txBody>
+          <a:bodyPr wrap="square" rtlCol="0">
+            <a:spAutoFit/>
+          </a:bodyPr>
+          <a:lstStyle/>
+          <a:p>
+            <a:pPr>
+              <a:lnSpc>
+                <a:spcPct val="150000"/>
+              </a:lnSpc>
+            </a:pPr>
+            <a:r>
+              <a:rPr lang="my-MM" dirty="0"/>
+              <a:t>တူညီတဲ့ </a:t>
+            </a:r>
+            <a:r>
+              <a:rPr lang="en-US" dirty="0"/>
+              <a:t>service instance </a:t>
+            </a:r>
+            <a:r>
+              <a:rPr lang="my-MM" dirty="0"/>
+              <a:t>ကို </a:t>
+            </a:r>
+            <a:r>
+              <a:rPr lang="en-US" dirty="0"/>
+              <a:t>Component </a:t>
+            </a:r>
+            <a:r>
+              <a:rPr lang="my-MM" dirty="0"/>
+              <a:t>အားလုံးအတွက် ရရှိပါမယ်။ ဒါပေမဲ့ တခြား </a:t>
+            </a:r>
+            <a:r>
+              <a:rPr lang="en-US" dirty="0"/>
+              <a:t>service </a:t>
+            </a:r>
+            <a:r>
+              <a:rPr lang="my-MM" dirty="0"/>
+              <a:t>တွေအတွက်တော့မရပါ။</a:t>
+            </a:r>
+            <a:endParaRPr lang="en-US" dirty="0"/>
+          </a:p>
+        </p:txBody>
+      </p:sp>
+      <p:sp>
+        <p:nvSpPr>
+          <p:cNvPr id="7" name="Rectangle 6">
+            <a:extLst>
+              <a:ext uri="{FF2B5EF4-FFF2-40B4-BE49-F238E27FC236}">
+                <a16:creationId xmlns:a16="http://schemas.microsoft.com/office/drawing/2014/main" id="{AE0389E4-7428-4B1E-B4B6-4D07700A2F90}"/>
+              </a:ext>
+            </a:extLst>
+          </p:cNvPr>
+          <p:cNvSpPr/>
+          <p:nvPr/>
+        </p:nvSpPr>
+        <p:spPr>
+          <a:xfrm>
+            <a:off x="1301931" y="4735790"/>
+            <a:ext cx="2865120" cy="870857"/>
+          </a:xfrm>
+          <a:prstGeom prst="rect">
+            <a:avLst/>
+          </a:prstGeom>
+          <a:solidFill>
+            <a:schemeClr val="accent1">
+              <a:lumMod val="75000"/>
+            </a:schemeClr>
+          </a:solidFill>
+        </p:spPr>
+        <p:style>
+          <a:lnRef idx="2">
+            <a:schemeClr val="accent4">
+              <a:shade val="50000"/>
+            </a:schemeClr>
+          </a:lnRef>
+          <a:fillRef idx="1">
+            <a:schemeClr val="accent4"/>
+          </a:fillRef>
+          <a:effectRef idx="0">
+            <a:schemeClr val="accent4"/>
+          </a:effectRef>
+          <a:fontRef idx="minor">
+            <a:schemeClr val="lt1"/>
+          </a:fontRef>
+        </p:style>
+        <p:txBody>
+          <a:bodyPr rtlCol="0" anchor="ctr"/>
+          <a:lstStyle/>
+          <a:p>
+            <a:pPr algn="ctr"/>
+            <a:r>
+              <a:rPr lang="en-US" dirty="0"/>
+              <a:t>Any Other Component</a:t>
+            </a:r>
+          </a:p>
+        </p:txBody>
+      </p:sp>
+      <p:sp>
+        <p:nvSpPr>
+          <p:cNvPr id="8" name="TextBox 7">
+            <a:extLst>
+              <a:ext uri="{FF2B5EF4-FFF2-40B4-BE49-F238E27FC236}">
+                <a16:creationId xmlns:a16="http://schemas.microsoft.com/office/drawing/2014/main" id="{50B464A4-FDFC-478E-8522-E2933D43851E}"/>
+              </a:ext>
+            </a:extLst>
+          </p:cNvPr>
+          <p:cNvSpPr txBox="1"/>
+          <p:nvPr/>
+        </p:nvSpPr>
+        <p:spPr>
+          <a:xfrm>
+            <a:off x="5212076" y="4724084"/>
+            <a:ext cx="5551715" cy="888705"/>
+          </a:xfrm>
+          <a:prstGeom prst="rect">
+            <a:avLst/>
+          </a:prstGeom>
+        </p:spPr>
+        <p:style>
+          <a:lnRef idx="2">
+            <a:schemeClr val="accent5"/>
+          </a:lnRef>
+          <a:fillRef idx="1">
+            <a:schemeClr val="lt1"/>
+          </a:fillRef>
+          <a:effectRef idx="0">
+            <a:schemeClr val="accent5"/>
+          </a:effectRef>
+          <a:fontRef idx="minor">
+            <a:schemeClr val="dk1"/>
+          </a:fontRef>
+        </p:style>
+        <p:txBody>
+          <a:bodyPr wrap="square" rtlCol="0">
+            <a:spAutoFit/>
+          </a:bodyPr>
+          <a:lstStyle/>
+          <a:p>
+            <a:pPr>
+              <a:lnSpc>
+                <a:spcPct val="150000"/>
+              </a:lnSpc>
+            </a:pPr>
+            <a:r>
+              <a:rPr lang="my-MM" dirty="0"/>
+              <a:t>တူညီတဲ့ </a:t>
+            </a:r>
+            <a:r>
+              <a:rPr lang="en-US" dirty="0"/>
+              <a:t>service instance </a:t>
+            </a:r>
+            <a:r>
+              <a:rPr lang="my-MM" dirty="0"/>
+              <a:t>ကို</a:t>
+            </a:r>
+            <a:r>
+              <a:rPr lang="en-US" dirty="0"/>
+              <a:t> </a:t>
+            </a:r>
+            <a:r>
+              <a:rPr lang="my-MM" dirty="0"/>
+              <a:t>ကြေငြာလိုက်တဲ့ </a:t>
+            </a:r>
+            <a:r>
+              <a:rPr lang="en-US" dirty="0"/>
+              <a:t>component </a:t>
+            </a:r>
+            <a:r>
+              <a:rPr lang="my-MM" dirty="0"/>
+              <a:t>နဲ့ သူ့ရဲ့ </a:t>
+            </a:r>
+            <a:r>
+              <a:rPr lang="en-US" dirty="0"/>
+              <a:t>child component </a:t>
+            </a:r>
+            <a:r>
+              <a:rPr lang="my-MM" dirty="0"/>
+              <a:t>တွေ အကုန်ရရှိပါမယ်။</a:t>
+            </a:r>
+            <a:endParaRPr lang="en-US" dirty="0"/>
+          </a:p>
+        </p:txBody>
+      </p:sp>
+    </p:spTree>
+    <p:extLst>
+      <p:ext uri="{BB962C8B-B14F-4D97-AF65-F5344CB8AC3E}">
+        <p14:creationId xmlns:p14="http://schemas.microsoft.com/office/powerpoint/2010/main" val="1131253338"/>
+      </p:ext>
+    </p:extLst>
+  </p:cSld>
+  <p:clrMapOvr>
+    <a:masterClrMapping/>
+  </p:clrMapOvr>
+</p:sld>
+</file>
+
+<file path=ppt/slides/slide15.xml><?xml version="1.0" encoding="utf-8"?>
+<p:sld xmlns:a="http://schemas.openxmlformats.org/drawingml/2006/main" xmlns:r="http://schemas.openxmlformats.org/officeDocument/2006/relationships" xmlns:p="http://schemas.openxmlformats.org/presentationml/2006/main">
+  <p:cSld>
+    <p:spTree>
+      <p:nvGrpSpPr>
+        <p:cNvPr id="1" name=""/>
+        <p:cNvGrpSpPr/>
+        <p:nvPr/>
+      </p:nvGrpSpPr>
+      <p:grpSpPr>
+        <a:xfrm>
+          <a:off x="0" y="0"/>
+          <a:ext cx="0" cy="0"/>
+          <a:chOff x="0" y="0"/>
+          <a:chExt cx="0" cy="0"/>
+        </a:xfrm>
+      </p:grpSpPr>
+      <p:sp>
+        <p:nvSpPr>
+          <p:cNvPr id="2" name="Rectangle: Rounded Corners 1">
+            <a:extLst>
+              <a:ext uri="{FF2B5EF4-FFF2-40B4-BE49-F238E27FC236}">
+                <a16:creationId xmlns:a16="http://schemas.microsoft.com/office/drawing/2014/main" id="{09D6A648-2CD1-40F1-B44C-08F512F71C15}"/>
+              </a:ext>
+            </a:extLst>
+          </p:cNvPr>
+          <p:cNvSpPr/>
+          <p:nvPr/>
+        </p:nvSpPr>
+        <p:spPr>
+          <a:xfrm>
+            <a:off x="836023" y="681759"/>
+            <a:ext cx="2316480" cy="914400"/>
+          </a:xfrm>
+          <a:prstGeom prst="roundRect">
+            <a:avLst/>
+          </a:prstGeom>
+          <a:solidFill>
+            <a:schemeClr val="accent1">
+              <a:lumMod val="75000"/>
+            </a:schemeClr>
+          </a:solidFill>
+        </p:spPr>
+        <p:style>
+          <a:lnRef idx="2">
+            <a:schemeClr val="accent1">
+              <a:shade val="50000"/>
+            </a:schemeClr>
+          </a:lnRef>
+          <a:fillRef idx="1">
+            <a:schemeClr val="accent1"/>
+          </a:fillRef>
+          <a:effectRef idx="0">
+            <a:schemeClr val="accent1"/>
+          </a:effectRef>
+          <a:fontRef idx="minor">
+            <a:schemeClr val="lt1"/>
+          </a:fontRef>
+        </p:style>
+        <p:txBody>
+          <a:bodyPr rtlCol="0" anchor="ctr"/>
+          <a:lstStyle/>
+          <a:p>
+            <a:pPr algn="ctr"/>
+            <a:r>
+              <a:rPr lang="en-US" dirty="0" err="1"/>
+              <a:t>AppComponent</a:t>
+            </a:r>
+            <a:endParaRPr lang="en-US" dirty="0"/>
+          </a:p>
+        </p:txBody>
+      </p:sp>
+      <p:sp>
+        <p:nvSpPr>
+          <p:cNvPr id="3" name="Rectangle: Rounded Corners 2">
+            <a:extLst>
+              <a:ext uri="{FF2B5EF4-FFF2-40B4-BE49-F238E27FC236}">
+                <a16:creationId xmlns:a16="http://schemas.microsoft.com/office/drawing/2014/main" id="{2E541144-4A24-4500-BA85-23104EE141B6}"/>
+              </a:ext>
+            </a:extLst>
+          </p:cNvPr>
+          <p:cNvSpPr/>
+          <p:nvPr/>
+        </p:nvSpPr>
+        <p:spPr>
+          <a:xfrm>
+            <a:off x="836023" y="2557242"/>
+            <a:ext cx="2316480" cy="914400"/>
+          </a:xfrm>
+          <a:prstGeom prst="roundRect">
+            <a:avLst/>
+          </a:prstGeom>
+          <a:solidFill>
+            <a:schemeClr val="accent1">
+              <a:lumMod val="75000"/>
+            </a:schemeClr>
+          </a:solidFill>
+        </p:spPr>
+        <p:style>
+          <a:lnRef idx="2">
+            <a:schemeClr val="accent1">
+              <a:shade val="50000"/>
+            </a:schemeClr>
+          </a:lnRef>
+          <a:fillRef idx="1">
+            <a:schemeClr val="accent1"/>
+          </a:fillRef>
+          <a:effectRef idx="0">
+            <a:schemeClr val="accent1"/>
+          </a:effectRef>
+          <a:fontRef idx="minor">
+            <a:schemeClr val="lt1"/>
+          </a:fontRef>
+        </p:style>
+        <p:txBody>
+          <a:bodyPr rtlCol="0" anchor="ctr"/>
+          <a:lstStyle/>
+          <a:p>
+            <a:pPr algn="ctr"/>
+            <a:r>
+              <a:rPr lang="en-US" dirty="0" err="1"/>
+              <a:t>ServersComponent</a:t>
+            </a:r>
+            <a:endParaRPr lang="en-US" dirty="0"/>
+          </a:p>
+        </p:txBody>
+      </p:sp>
+      <p:sp>
+        <p:nvSpPr>
+          <p:cNvPr id="4" name="Rectangle: Rounded Corners 3">
+            <a:extLst>
+              <a:ext uri="{FF2B5EF4-FFF2-40B4-BE49-F238E27FC236}">
+                <a16:creationId xmlns:a16="http://schemas.microsoft.com/office/drawing/2014/main" id="{2F4EB003-21E8-4596-AF1C-ABF1419529BD}"/>
+              </a:ext>
+            </a:extLst>
+          </p:cNvPr>
+          <p:cNvSpPr/>
+          <p:nvPr/>
+        </p:nvSpPr>
+        <p:spPr>
+          <a:xfrm>
+            <a:off x="836023" y="4272909"/>
+            <a:ext cx="2316480" cy="914400"/>
+          </a:xfrm>
+          <a:prstGeom prst="roundRect">
+            <a:avLst/>
+          </a:prstGeom>
+          <a:solidFill>
+            <a:schemeClr val="accent1">
+              <a:lumMod val="75000"/>
+            </a:schemeClr>
+          </a:solidFill>
+        </p:spPr>
+        <p:style>
+          <a:lnRef idx="2">
+            <a:schemeClr val="accent1">
+              <a:shade val="50000"/>
+            </a:schemeClr>
+          </a:lnRef>
+          <a:fillRef idx="1">
+            <a:schemeClr val="accent1"/>
+          </a:fillRef>
+          <a:effectRef idx="0">
+            <a:schemeClr val="accent1"/>
+          </a:effectRef>
+          <a:fontRef idx="minor">
+            <a:schemeClr val="lt1"/>
+          </a:fontRef>
+        </p:style>
+        <p:txBody>
+          <a:bodyPr rtlCol="0" anchor="ctr"/>
+          <a:lstStyle/>
+          <a:p>
+            <a:pPr algn="ctr"/>
+            <a:r>
+              <a:rPr lang="en-US" dirty="0" err="1"/>
+              <a:t>ServerComponent</a:t>
+            </a:r>
+            <a:endParaRPr lang="en-US" dirty="0"/>
+          </a:p>
+        </p:txBody>
+      </p:sp>
+      <p:sp>
+        <p:nvSpPr>
+          <p:cNvPr id="15" name="TextBox 14">
+            <a:extLst>
+              <a:ext uri="{FF2B5EF4-FFF2-40B4-BE49-F238E27FC236}">
+                <a16:creationId xmlns:a16="http://schemas.microsoft.com/office/drawing/2014/main" id="{2AE4E881-3C9B-4B1D-9AF2-7F1EB90E5BAF}"/>
+              </a:ext>
+            </a:extLst>
+          </p:cNvPr>
+          <p:cNvSpPr txBox="1"/>
+          <p:nvPr/>
+        </p:nvSpPr>
+        <p:spPr>
+          <a:xfrm>
+            <a:off x="836023" y="5809309"/>
+            <a:ext cx="9457509" cy="473206"/>
+          </a:xfrm>
+          <a:prstGeom prst="rect">
+            <a:avLst/>
+          </a:prstGeom>
+        </p:spPr>
+        <p:style>
+          <a:lnRef idx="2">
+            <a:schemeClr val="accent1"/>
+          </a:lnRef>
+          <a:fillRef idx="1">
+            <a:schemeClr val="lt1"/>
+          </a:fillRef>
+          <a:effectRef idx="0">
+            <a:schemeClr val="accent1"/>
+          </a:effectRef>
+          <a:fontRef idx="minor">
+            <a:schemeClr val="dk1"/>
+          </a:fontRef>
+        </p:style>
+        <p:txBody>
+          <a:bodyPr wrap="square" rtlCol="0">
+            <a:spAutoFit/>
+          </a:bodyPr>
+          <a:lstStyle/>
+          <a:p>
+            <a:pPr>
+              <a:lnSpc>
+                <a:spcPct val="150000"/>
+              </a:lnSpc>
+            </a:pPr>
+            <a:r>
+              <a:rPr lang="en-US" dirty="0"/>
+              <a:t>Component </a:t>
+            </a:r>
+            <a:r>
+              <a:rPr lang="my-MM" dirty="0"/>
+              <a:t>တိုင်းမှာ </a:t>
+            </a:r>
+            <a:r>
+              <a:rPr lang="en-US" dirty="0"/>
+              <a:t>service instance </a:t>
+            </a:r>
+            <a:r>
+              <a:rPr lang="my-MM" dirty="0"/>
+              <a:t>တောင်းယူထားတာကြောင့် </a:t>
+            </a:r>
+            <a:r>
+              <a:rPr lang="en-US" dirty="0"/>
+              <a:t>service instance </a:t>
+            </a:r>
+            <a:r>
+              <a:rPr lang="my-MM" dirty="0"/>
+              <a:t>မတူတော့ပါ</a:t>
+            </a:r>
+          </a:p>
+        </p:txBody>
+      </p:sp>
+      <p:grpSp>
+        <p:nvGrpSpPr>
+          <p:cNvPr id="18" name="Group 17">
+            <a:extLst>
+              <a:ext uri="{FF2B5EF4-FFF2-40B4-BE49-F238E27FC236}">
+                <a16:creationId xmlns:a16="http://schemas.microsoft.com/office/drawing/2014/main" id="{24438CAD-16B5-4DA0-85DA-34A8CCC3005D}"/>
+              </a:ext>
+            </a:extLst>
+          </p:cNvPr>
+          <p:cNvGrpSpPr/>
+          <p:nvPr/>
+        </p:nvGrpSpPr>
+        <p:grpSpPr>
+          <a:xfrm>
+            <a:off x="2609306" y="376481"/>
+            <a:ext cx="1245326" cy="705786"/>
+            <a:chOff x="2808515" y="571805"/>
+            <a:chExt cx="1245326" cy="705786"/>
+          </a:xfrm>
+          <a:solidFill>
+            <a:schemeClr val="accent6">
+              <a:lumMod val="75000"/>
+            </a:schemeClr>
+          </a:solidFill>
+        </p:grpSpPr>
+        <p:sp>
+          <p:nvSpPr>
+            <p:cNvPr id="16" name="Oval 15">
+              <a:extLst>
+                <a:ext uri="{FF2B5EF4-FFF2-40B4-BE49-F238E27FC236}">
+                  <a16:creationId xmlns:a16="http://schemas.microsoft.com/office/drawing/2014/main" id="{1370A3E4-F030-4FE1-87B7-763552B33803}"/>
+                </a:ext>
+              </a:extLst>
+            </p:cNvPr>
+            <p:cNvSpPr/>
+            <p:nvPr/>
+          </p:nvSpPr>
+          <p:spPr>
+            <a:xfrm>
+              <a:off x="2808515" y="571805"/>
+              <a:ext cx="1245326" cy="705786"/>
+            </a:xfrm>
+            <a:prstGeom prst="ellipse">
+              <a:avLst/>
+            </a:prstGeom>
+            <a:grpFill/>
+          </p:spPr>
+          <p:style>
+            <a:lnRef idx="2">
+              <a:schemeClr val="accent1">
+                <a:shade val="50000"/>
+              </a:schemeClr>
+            </a:lnRef>
+            <a:fillRef idx="1">
+              <a:schemeClr val="accent1"/>
+            </a:fillRef>
+            <a:effectRef idx="0">
+              <a:schemeClr val="accent1"/>
+            </a:effectRef>
+            <a:fontRef idx="minor">
+              <a:schemeClr val="lt1"/>
+            </a:fontRef>
+          </p:style>
+          <p:txBody>
+            <a:bodyPr rtlCol="0" anchor="ctr"/>
+            <a:lstStyle/>
+            <a:p>
+              <a:pPr algn="ctr"/>
+              <a:r>
+                <a:rPr lang="my-MM" dirty="0"/>
+                <a:t> </a:t>
+              </a:r>
+              <a:endParaRPr lang="en-US" dirty="0"/>
+            </a:p>
+          </p:txBody>
+        </p:sp>
+        <p:sp>
+          <p:nvSpPr>
+            <p:cNvPr id="17" name="TextBox 16">
+              <a:extLst>
+                <a:ext uri="{FF2B5EF4-FFF2-40B4-BE49-F238E27FC236}">
+                  <a16:creationId xmlns:a16="http://schemas.microsoft.com/office/drawing/2014/main" id="{E77DA11E-161D-431B-9DFD-A85A00DC2B0E}"/>
+                </a:ext>
+              </a:extLst>
+            </p:cNvPr>
+            <p:cNvSpPr txBox="1"/>
+            <p:nvPr/>
+          </p:nvSpPr>
+          <p:spPr>
+            <a:xfrm>
+              <a:off x="2887981" y="770809"/>
+              <a:ext cx="1138645" cy="307777"/>
+            </a:xfrm>
+            <a:prstGeom prst="rect">
+              <a:avLst/>
+            </a:prstGeom>
+            <a:grpFill/>
+          </p:spPr>
+          <p:txBody>
+            <a:bodyPr wrap="square" rtlCol="0">
+              <a:spAutoFit/>
+            </a:bodyPr>
+            <a:lstStyle/>
+            <a:p>
+              <a:r>
+                <a:rPr lang="en-US" sz="1400" dirty="0">
+                  <a:solidFill>
+                    <a:schemeClr val="bg1"/>
+                  </a:solidFill>
+                </a:rPr>
+                <a:t>new instance</a:t>
+              </a:r>
+            </a:p>
+          </p:txBody>
+        </p:sp>
+      </p:grpSp>
+      <p:grpSp>
+        <p:nvGrpSpPr>
+          <p:cNvPr id="21" name="Group 20">
+            <a:extLst>
+              <a:ext uri="{FF2B5EF4-FFF2-40B4-BE49-F238E27FC236}">
+                <a16:creationId xmlns:a16="http://schemas.microsoft.com/office/drawing/2014/main" id="{EB5C3D3B-3869-44ED-A22D-21D88B21669A}"/>
+              </a:ext>
+            </a:extLst>
+          </p:cNvPr>
+          <p:cNvGrpSpPr/>
+          <p:nvPr/>
+        </p:nvGrpSpPr>
+        <p:grpSpPr>
+          <a:xfrm>
+            <a:off x="2616926" y="2253147"/>
+            <a:ext cx="1245326" cy="705786"/>
+            <a:chOff x="2808515" y="571805"/>
+            <a:chExt cx="1245326" cy="705786"/>
+          </a:xfrm>
+          <a:solidFill>
+            <a:schemeClr val="accent6">
+              <a:lumMod val="75000"/>
+            </a:schemeClr>
+          </a:solidFill>
+        </p:grpSpPr>
+        <p:sp>
+          <p:nvSpPr>
+            <p:cNvPr id="22" name="Oval 21">
+              <a:extLst>
+                <a:ext uri="{FF2B5EF4-FFF2-40B4-BE49-F238E27FC236}">
+                  <a16:creationId xmlns:a16="http://schemas.microsoft.com/office/drawing/2014/main" id="{368BF4C0-2A9D-4979-B549-6FFFD88181E2}"/>
+                </a:ext>
+              </a:extLst>
+            </p:cNvPr>
+            <p:cNvSpPr/>
+            <p:nvPr/>
+          </p:nvSpPr>
+          <p:spPr>
+            <a:xfrm>
+              <a:off x="2808515" y="571805"/>
+              <a:ext cx="1245326" cy="705786"/>
+            </a:xfrm>
+            <a:prstGeom prst="ellipse">
+              <a:avLst/>
+            </a:prstGeom>
+            <a:grpFill/>
+          </p:spPr>
+          <p:style>
+            <a:lnRef idx="2">
+              <a:schemeClr val="accent1">
+                <a:shade val="50000"/>
+              </a:schemeClr>
+            </a:lnRef>
+            <a:fillRef idx="1">
+              <a:schemeClr val="accent1"/>
+            </a:fillRef>
+            <a:effectRef idx="0">
+              <a:schemeClr val="accent1"/>
+            </a:effectRef>
+            <a:fontRef idx="minor">
+              <a:schemeClr val="lt1"/>
+            </a:fontRef>
+          </p:style>
+          <p:txBody>
+            <a:bodyPr rtlCol="0" anchor="ctr"/>
+            <a:lstStyle/>
+            <a:p>
+              <a:pPr algn="ctr"/>
+              <a:r>
+                <a:rPr lang="my-MM" dirty="0"/>
+                <a:t> </a:t>
+              </a:r>
+              <a:endParaRPr lang="en-US" dirty="0"/>
+            </a:p>
+          </p:txBody>
+        </p:sp>
+        <p:sp>
+          <p:nvSpPr>
+            <p:cNvPr id="23" name="TextBox 22">
+              <a:extLst>
+                <a:ext uri="{FF2B5EF4-FFF2-40B4-BE49-F238E27FC236}">
+                  <a16:creationId xmlns:a16="http://schemas.microsoft.com/office/drawing/2014/main" id="{8BB3AC03-4BFA-45D9-8B95-103F0F504BDA}"/>
+                </a:ext>
+              </a:extLst>
+            </p:cNvPr>
+            <p:cNvSpPr txBox="1"/>
+            <p:nvPr/>
+          </p:nvSpPr>
+          <p:spPr>
+            <a:xfrm>
+              <a:off x="2887981" y="770809"/>
+              <a:ext cx="1138645" cy="307777"/>
+            </a:xfrm>
+            <a:prstGeom prst="rect">
+              <a:avLst/>
+            </a:prstGeom>
+            <a:grpFill/>
+          </p:spPr>
+          <p:txBody>
+            <a:bodyPr wrap="square" rtlCol="0">
+              <a:spAutoFit/>
+            </a:bodyPr>
+            <a:lstStyle/>
+            <a:p>
+              <a:r>
+                <a:rPr lang="en-US" sz="1400" dirty="0">
+                  <a:solidFill>
+                    <a:schemeClr val="bg1"/>
+                  </a:solidFill>
+                </a:rPr>
+                <a:t>new instance</a:t>
+              </a:r>
+            </a:p>
+          </p:txBody>
+        </p:sp>
+      </p:grpSp>
+      <p:grpSp>
+        <p:nvGrpSpPr>
+          <p:cNvPr id="24" name="Group 23">
+            <a:extLst>
+              <a:ext uri="{FF2B5EF4-FFF2-40B4-BE49-F238E27FC236}">
+                <a16:creationId xmlns:a16="http://schemas.microsoft.com/office/drawing/2014/main" id="{81B0AA13-B8E3-4224-B264-DDBBA7B508F4}"/>
+              </a:ext>
+            </a:extLst>
+          </p:cNvPr>
+          <p:cNvGrpSpPr/>
+          <p:nvPr/>
+        </p:nvGrpSpPr>
+        <p:grpSpPr>
+          <a:xfrm>
+            <a:off x="2688772" y="3920016"/>
+            <a:ext cx="1245326" cy="705786"/>
+            <a:chOff x="2808515" y="571805"/>
+            <a:chExt cx="1245326" cy="705786"/>
+          </a:xfrm>
+          <a:solidFill>
+            <a:schemeClr val="accent6">
+              <a:lumMod val="75000"/>
+            </a:schemeClr>
+          </a:solidFill>
+        </p:grpSpPr>
+        <p:sp>
+          <p:nvSpPr>
+            <p:cNvPr id="25" name="Oval 24">
+              <a:extLst>
+                <a:ext uri="{FF2B5EF4-FFF2-40B4-BE49-F238E27FC236}">
+                  <a16:creationId xmlns:a16="http://schemas.microsoft.com/office/drawing/2014/main" id="{0CEF627E-9168-4275-AE84-E07590CC7999}"/>
+                </a:ext>
+              </a:extLst>
+            </p:cNvPr>
+            <p:cNvSpPr/>
+            <p:nvPr/>
+          </p:nvSpPr>
+          <p:spPr>
+            <a:xfrm>
+              <a:off x="2808515" y="571805"/>
+              <a:ext cx="1245326" cy="705786"/>
+            </a:xfrm>
+            <a:prstGeom prst="ellipse">
+              <a:avLst/>
+            </a:prstGeom>
+            <a:grpFill/>
+          </p:spPr>
+          <p:style>
+            <a:lnRef idx="2">
+              <a:schemeClr val="accent1">
+                <a:shade val="50000"/>
+              </a:schemeClr>
+            </a:lnRef>
+            <a:fillRef idx="1">
+              <a:schemeClr val="accent1"/>
+            </a:fillRef>
+            <a:effectRef idx="0">
+              <a:schemeClr val="accent1"/>
+            </a:effectRef>
+            <a:fontRef idx="minor">
+              <a:schemeClr val="lt1"/>
+            </a:fontRef>
+          </p:style>
+          <p:txBody>
+            <a:bodyPr rtlCol="0" anchor="ctr"/>
+            <a:lstStyle/>
+            <a:p>
+              <a:pPr algn="ctr"/>
+              <a:r>
+                <a:rPr lang="my-MM" dirty="0"/>
+                <a:t> </a:t>
+              </a:r>
+              <a:endParaRPr lang="en-US" dirty="0"/>
+            </a:p>
+          </p:txBody>
+        </p:sp>
+        <p:sp>
+          <p:nvSpPr>
+            <p:cNvPr id="26" name="TextBox 25">
+              <a:extLst>
+                <a:ext uri="{FF2B5EF4-FFF2-40B4-BE49-F238E27FC236}">
+                  <a16:creationId xmlns:a16="http://schemas.microsoft.com/office/drawing/2014/main" id="{647D4C87-7DFD-4A8B-9092-97AB6D31B798}"/>
+                </a:ext>
+              </a:extLst>
+            </p:cNvPr>
+            <p:cNvSpPr txBox="1"/>
+            <p:nvPr/>
+          </p:nvSpPr>
+          <p:spPr>
+            <a:xfrm>
+              <a:off x="2887981" y="770809"/>
+              <a:ext cx="1138645" cy="307777"/>
+            </a:xfrm>
+            <a:prstGeom prst="rect">
+              <a:avLst/>
+            </a:prstGeom>
+            <a:grpFill/>
+          </p:spPr>
+          <p:txBody>
+            <a:bodyPr wrap="square" rtlCol="0">
+              <a:spAutoFit/>
+            </a:bodyPr>
+            <a:lstStyle/>
+            <a:p>
+              <a:r>
+                <a:rPr lang="en-US" sz="1400" dirty="0">
+                  <a:solidFill>
+                    <a:schemeClr val="bg1"/>
+                  </a:solidFill>
+                </a:rPr>
+                <a:t>new instance</a:t>
+              </a:r>
+            </a:p>
+          </p:txBody>
+        </p:sp>
+      </p:grpSp>
+      <p:sp>
+        <p:nvSpPr>
+          <p:cNvPr id="27" name="TextBox 26">
+            <a:extLst>
+              <a:ext uri="{FF2B5EF4-FFF2-40B4-BE49-F238E27FC236}">
+                <a16:creationId xmlns:a16="http://schemas.microsoft.com/office/drawing/2014/main" id="{5B5681B7-A3C9-4FE9-8802-751948A55EFD}"/>
+              </a:ext>
+            </a:extLst>
+          </p:cNvPr>
+          <p:cNvSpPr txBox="1"/>
+          <p:nvPr/>
+        </p:nvSpPr>
+        <p:spPr>
+          <a:xfrm>
+            <a:off x="4550230" y="729373"/>
+            <a:ext cx="5743302" cy="923330"/>
+          </a:xfrm>
+          <a:prstGeom prst="rect">
+            <a:avLst/>
+          </a:prstGeom>
+        </p:spPr>
+        <p:style>
+          <a:lnRef idx="2">
+            <a:schemeClr val="accent1"/>
+          </a:lnRef>
+          <a:fillRef idx="1">
+            <a:schemeClr val="lt1"/>
+          </a:fillRef>
+          <a:effectRef idx="0">
+            <a:schemeClr val="accent1"/>
+          </a:effectRef>
+          <a:fontRef idx="minor">
+            <a:schemeClr val="dk1"/>
+          </a:fontRef>
+        </p:style>
+        <p:txBody>
+          <a:bodyPr wrap="square" rtlCol="0">
+            <a:spAutoFit/>
+          </a:bodyPr>
+          <a:lstStyle/>
+          <a:p>
+            <a:pPr>
+              <a:lnSpc>
+                <a:spcPct val="150000"/>
+              </a:lnSpc>
+            </a:pPr>
+            <a:r>
+              <a:rPr lang="en-US" dirty="0"/>
+              <a:t>Provide </a:t>
+            </a:r>
+            <a:r>
+              <a:rPr lang="my-MM" dirty="0"/>
+              <a:t>လုပ်ပေးဖို့တောင်းတဲ့အတွက် </a:t>
+            </a:r>
+            <a:r>
+              <a:rPr lang="en-US" dirty="0"/>
+              <a:t>service instance </a:t>
+            </a:r>
+            <a:r>
+              <a:rPr lang="my-MM" dirty="0"/>
+              <a:t>အသစ်တစ်ခုကိုရတယ်။</a:t>
+            </a:r>
+          </a:p>
+        </p:txBody>
+      </p:sp>
+      <p:sp>
+        <p:nvSpPr>
+          <p:cNvPr id="28" name="TextBox 27">
+            <a:extLst>
+              <a:ext uri="{FF2B5EF4-FFF2-40B4-BE49-F238E27FC236}">
+                <a16:creationId xmlns:a16="http://schemas.microsoft.com/office/drawing/2014/main" id="{E20185AC-7FAF-431E-AC4F-903A2AB2077E}"/>
+              </a:ext>
+            </a:extLst>
+          </p:cNvPr>
+          <p:cNvSpPr txBox="1"/>
+          <p:nvPr/>
+        </p:nvSpPr>
+        <p:spPr>
+          <a:xfrm>
+            <a:off x="4550230" y="2606039"/>
+            <a:ext cx="5743302" cy="923330"/>
+          </a:xfrm>
+          <a:prstGeom prst="rect">
+            <a:avLst/>
+          </a:prstGeom>
+        </p:spPr>
+        <p:style>
+          <a:lnRef idx="2">
+            <a:schemeClr val="accent1"/>
+          </a:lnRef>
+          <a:fillRef idx="1">
+            <a:schemeClr val="lt1"/>
+          </a:fillRef>
+          <a:effectRef idx="0">
+            <a:schemeClr val="accent1"/>
+          </a:effectRef>
+          <a:fontRef idx="minor">
+            <a:schemeClr val="dk1"/>
+          </a:fontRef>
+        </p:style>
+        <p:txBody>
+          <a:bodyPr wrap="square" rtlCol="0">
+            <a:spAutoFit/>
+          </a:bodyPr>
+          <a:lstStyle/>
+          <a:p>
+            <a:pPr>
+              <a:lnSpc>
+                <a:spcPct val="150000"/>
+              </a:lnSpc>
+            </a:pPr>
+            <a:r>
+              <a:rPr lang="my-MM" dirty="0"/>
+              <a:t>ဒီမှာထပ်ပြီး </a:t>
+            </a:r>
+            <a:r>
+              <a:rPr lang="en-US" dirty="0"/>
+              <a:t>provide </a:t>
+            </a:r>
+            <a:r>
+              <a:rPr lang="my-MM" dirty="0"/>
+              <a:t>လုပ်ပေးခိုင်းတဲ့အတွက် </a:t>
+            </a:r>
+            <a:r>
+              <a:rPr lang="en-US" dirty="0"/>
+              <a:t>new instance </a:t>
+            </a:r>
+            <a:r>
+              <a:rPr lang="my-MM" dirty="0"/>
+              <a:t>ထပ်ရပါတယ်။</a:t>
+            </a:r>
+          </a:p>
+        </p:txBody>
+      </p:sp>
+      <p:sp>
+        <p:nvSpPr>
+          <p:cNvPr id="29" name="TextBox 28">
+            <a:extLst>
+              <a:ext uri="{FF2B5EF4-FFF2-40B4-BE49-F238E27FC236}">
+                <a16:creationId xmlns:a16="http://schemas.microsoft.com/office/drawing/2014/main" id="{0CCAAE4A-C8CC-478D-95C2-2BB21AD48BF7}"/>
+              </a:ext>
+            </a:extLst>
+          </p:cNvPr>
+          <p:cNvSpPr txBox="1"/>
+          <p:nvPr/>
+        </p:nvSpPr>
+        <p:spPr>
+          <a:xfrm>
+            <a:off x="4550230" y="4507747"/>
+            <a:ext cx="5743302" cy="473206"/>
+          </a:xfrm>
+          <a:prstGeom prst="rect">
+            <a:avLst/>
+          </a:prstGeom>
+        </p:spPr>
+        <p:style>
+          <a:lnRef idx="2">
+            <a:schemeClr val="accent1"/>
+          </a:lnRef>
+          <a:fillRef idx="1">
+            <a:schemeClr val="lt1"/>
+          </a:fillRef>
+          <a:effectRef idx="0">
+            <a:schemeClr val="accent1"/>
+          </a:effectRef>
+          <a:fontRef idx="minor">
+            <a:schemeClr val="dk1"/>
+          </a:fontRef>
+        </p:style>
+        <p:txBody>
+          <a:bodyPr wrap="square" rtlCol="0">
+            <a:spAutoFit/>
+          </a:bodyPr>
+          <a:lstStyle/>
+          <a:p>
+            <a:pPr>
+              <a:lnSpc>
+                <a:spcPct val="150000"/>
+              </a:lnSpc>
+            </a:pPr>
+            <a:r>
+              <a:rPr lang="my-MM" dirty="0"/>
+              <a:t>ဒီမှာလည်း အတူတူပါပဲ </a:t>
+            </a:r>
+            <a:r>
+              <a:rPr lang="en-US" dirty="0"/>
+              <a:t>new instance </a:t>
+            </a:r>
+            <a:r>
+              <a:rPr lang="my-MM" dirty="0"/>
+              <a:t>ထပ်ရပြန်ပါတယ်။</a:t>
+            </a:r>
+          </a:p>
+        </p:txBody>
+      </p:sp>
+    </p:spTree>
+    <p:extLst>
+      <p:ext uri="{BB962C8B-B14F-4D97-AF65-F5344CB8AC3E}">
+        <p14:creationId xmlns:p14="http://schemas.microsoft.com/office/powerpoint/2010/main" val="978717030"/>
+      </p:ext>
+    </p:extLst>
+  </p:cSld>
+  <p:clrMapOvr>
+    <a:masterClrMapping/>
+  </p:clrMapOvr>
+</p:sld>
+</file>
+
 <file path=ppt/slides/slide2.xml><?xml version="1.0" encoding="utf-8"?>
 <p:sld xmlns:a="http://schemas.openxmlformats.org/drawingml/2006/main" xmlns:r="http://schemas.openxmlformats.org/officeDocument/2006/relationships" xmlns:p="http://schemas.openxmlformats.org/presentationml/2006/main">
   <p:cSld>

</xml_diff>

<commit_message>
[fixed] mini-pos logo issue
</commit_message>
<xml_diff>
--- a/Resources/Notes.pptx
+++ b/Resources/Notes.pptx
@@ -5784,122 +5784,100 @@
           </a:p>
         </p:txBody>
       </p:sp>
-      <p:grpSp>
-        <p:nvGrpSpPr>
-          <p:cNvPr id="18" name="Group 17">
-            <a:extLst>
-              <a:ext uri="{FF2B5EF4-FFF2-40B4-BE49-F238E27FC236}">
-                <a16:creationId xmlns:a16="http://schemas.microsoft.com/office/drawing/2014/main" id="{24438CAD-16B5-4DA0-85DA-34A8CCC3005D}"/>
-              </a:ext>
-            </a:extLst>
-          </p:cNvPr>
-          <p:cNvGrpSpPr/>
-          <p:nvPr/>
-        </p:nvGrpSpPr>
-        <p:grpSpPr>
+      <p:sp>
+        <p:nvSpPr>
+          <p:cNvPr id="16" name="Oval 15">
+            <a:extLst>
+              <a:ext uri="{FF2B5EF4-FFF2-40B4-BE49-F238E27FC236}">
+                <a16:creationId xmlns:a16="http://schemas.microsoft.com/office/drawing/2014/main" id="{1370A3E4-F030-4FE1-87B7-763552B33803}"/>
+              </a:ext>
+            </a:extLst>
+          </p:cNvPr>
+          <p:cNvSpPr/>
+          <p:nvPr/>
+        </p:nvSpPr>
+        <p:spPr>
           <a:xfrm>
             <a:off x="2609306" y="376481"/>
             <a:ext cx="1245326" cy="705786"/>
-            <a:chOff x="2808515" y="571805"/>
-            <a:chExt cx="1245326" cy="705786"/>
-          </a:xfrm>
+          </a:xfrm>
+          <a:prstGeom prst="ellipse">
+            <a:avLst/>
+          </a:prstGeom>
           <a:solidFill>
             <a:schemeClr val="accent6">
               <a:lumMod val="75000"/>
             </a:schemeClr>
           </a:solidFill>
-        </p:grpSpPr>
-        <p:sp>
-          <p:nvSpPr>
-            <p:cNvPr id="16" name="Oval 15">
-              <a:extLst>
-                <a:ext uri="{FF2B5EF4-FFF2-40B4-BE49-F238E27FC236}">
-                  <a16:creationId xmlns:a16="http://schemas.microsoft.com/office/drawing/2014/main" id="{1370A3E4-F030-4FE1-87B7-763552B33803}"/>
-                </a:ext>
-              </a:extLst>
-            </p:cNvPr>
-            <p:cNvSpPr/>
-            <p:nvPr/>
-          </p:nvSpPr>
-          <p:spPr>
-            <a:xfrm>
-              <a:off x="2808515" y="571805"/>
-              <a:ext cx="1245326" cy="705786"/>
-            </a:xfrm>
-            <a:prstGeom prst="ellipse">
-              <a:avLst/>
-            </a:prstGeom>
-            <a:grpFill/>
-          </p:spPr>
-          <p:style>
-            <a:lnRef idx="2">
-              <a:schemeClr val="accent1">
-                <a:shade val="50000"/>
-              </a:schemeClr>
-            </a:lnRef>
-            <a:fillRef idx="1">
-              <a:schemeClr val="accent1"/>
-            </a:fillRef>
-            <a:effectRef idx="0">
-              <a:schemeClr val="accent1"/>
-            </a:effectRef>
-            <a:fontRef idx="minor">
-              <a:schemeClr val="lt1"/>
-            </a:fontRef>
-          </p:style>
-          <p:txBody>
-            <a:bodyPr rtlCol="0" anchor="ctr"/>
-            <a:lstStyle/>
-            <a:p>
-              <a:pPr algn="ctr"/>
-              <a:r>
-                <a:rPr lang="my-MM" dirty="0"/>
-                <a:t> </a:t>
-              </a:r>
-              <a:endParaRPr lang="en-US" dirty="0"/>
-            </a:p>
-          </p:txBody>
-        </p:sp>
-        <p:sp>
-          <p:nvSpPr>
-            <p:cNvPr id="17" name="TextBox 16">
-              <a:extLst>
-                <a:ext uri="{FF2B5EF4-FFF2-40B4-BE49-F238E27FC236}">
-                  <a16:creationId xmlns:a16="http://schemas.microsoft.com/office/drawing/2014/main" id="{E77DA11E-161D-431B-9DFD-A85A00DC2B0E}"/>
-                </a:ext>
-              </a:extLst>
-            </p:cNvPr>
-            <p:cNvSpPr txBox="1"/>
-            <p:nvPr/>
-          </p:nvSpPr>
-          <p:spPr>
-            <a:xfrm>
-              <a:off x="2887981" y="770809"/>
-              <a:ext cx="1138645" cy="307777"/>
-            </a:xfrm>
-            <a:prstGeom prst="rect">
-              <a:avLst/>
-            </a:prstGeom>
-            <a:grpFill/>
-          </p:spPr>
-          <p:txBody>
-            <a:bodyPr wrap="square" rtlCol="0">
-              <a:spAutoFit/>
-            </a:bodyPr>
-            <a:lstStyle/>
-            <a:p>
-              <a:r>
-                <a:rPr lang="en-US" sz="1400" dirty="0">
-                  <a:solidFill>
-                    <a:schemeClr val="bg1"/>
-                  </a:solidFill>
-                </a:rPr>
-                <a:t>new instance</a:t>
-              </a:r>
-            </a:p>
-          </p:txBody>
-        </p:sp>
-      </p:grpSp>
+        </p:spPr>
+        <p:style>
+          <a:lnRef idx="2">
+            <a:schemeClr val="accent1">
+              <a:shade val="50000"/>
+            </a:schemeClr>
+          </a:lnRef>
+          <a:fillRef idx="1">
+            <a:schemeClr val="accent1"/>
+          </a:fillRef>
+          <a:effectRef idx="0">
+            <a:schemeClr val="accent1"/>
+          </a:effectRef>
+          <a:fontRef idx="minor">
+            <a:schemeClr val="lt1"/>
+          </a:fontRef>
+        </p:style>
+        <p:txBody>
+          <a:bodyPr rtlCol="0" anchor="ctr"/>
+          <a:lstStyle/>
+          <a:p>
+            <a:pPr algn="ctr"/>
+            <a:r>
+              <a:rPr lang="my-MM" dirty="0"/>
+              <a:t> </a:t>
+            </a:r>
+            <a:endParaRPr lang="en-US" dirty="0"/>
+          </a:p>
+        </p:txBody>
+      </p:sp>
+      <p:sp>
+        <p:nvSpPr>
+          <p:cNvPr id="17" name="TextBox 16">
+            <a:extLst>
+              <a:ext uri="{FF2B5EF4-FFF2-40B4-BE49-F238E27FC236}">
+                <a16:creationId xmlns:a16="http://schemas.microsoft.com/office/drawing/2014/main" id="{E77DA11E-161D-431B-9DFD-A85A00DC2B0E}"/>
+              </a:ext>
+            </a:extLst>
+          </p:cNvPr>
+          <p:cNvSpPr txBox="1"/>
+          <p:nvPr/>
+        </p:nvSpPr>
+        <p:spPr>
+          <a:xfrm>
+            <a:off x="2688772" y="575485"/>
+            <a:ext cx="1138645" cy="307777"/>
+          </a:xfrm>
+          <a:prstGeom prst="rect">
+            <a:avLst/>
+          </a:prstGeom>
+          <a:noFill/>
+        </p:spPr>
+        <p:txBody>
+          <a:bodyPr wrap="square" rtlCol="0">
+            <a:spAutoFit/>
+          </a:bodyPr>
+          <a:lstStyle/>
+          <a:p>
+            <a:r>
+              <a:rPr lang="en-US" sz="1400" dirty="0">
+                <a:solidFill>
+                  <a:schemeClr val="bg1"/>
+                </a:solidFill>
+              </a:rPr>
+              <a:t>new instance</a:t>
+            </a:r>
+          </a:p>
+        </p:txBody>
+      </p:sp>
       <p:grpSp>
         <p:nvGrpSpPr>
           <p:cNvPr id="21" name="Group 20">
@@ -5996,7 +5974,7 @@
             <a:prstGeom prst="rect">
               <a:avLst/>
             </a:prstGeom>
-            <a:grpFill/>
+            <a:noFill/>
           </p:spPr>
           <p:txBody>
             <a:bodyPr wrap="square" rtlCol="0">
@@ -6112,7 +6090,7 @@
             <a:prstGeom prst="rect">
               <a:avLst/>
             </a:prstGeom>
-            <a:grpFill/>
+            <a:noFill/>
           </p:spPr>
           <p:txBody>
             <a:bodyPr wrap="square" rtlCol="0">

</xml_diff>